<commit_message>
Small edit to the short presentation
</commit_message>
<xml_diff>
--- a/Documentation/Presentation/High speed thermocouple logger - short.pptx
+++ b/Documentation/Presentation/High speed thermocouple logger - short.pptx
@@ -5,7 +5,7 @@
     <p:sldMasterId id="2147483659" r:id="rId1"/>
   </p:sldMasterIdLst>
   <p:notesMasterIdLst>
-    <p:notesMasterId r:id="rId28"/>
+    <p:notesMasterId r:id="rId27"/>
   </p:notesMasterIdLst>
   <p:sldIdLst>
     <p:sldId id="256" r:id="rId2"/>
@@ -14,43 +14,42 @@
     <p:sldId id="260" r:id="rId5"/>
     <p:sldId id="261" r:id="rId6"/>
     <p:sldId id="262" r:id="rId7"/>
-    <p:sldId id="264" r:id="rId8"/>
+    <p:sldId id="268" r:id="rId8"/>
     <p:sldId id="265" r:id="rId9"/>
     <p:sldId id="267" r:id="rId10"/>
-    <p:sldId id="268" r:id="rId11"/>
-    <p:sldId id="269" r:id="rId12"/>
-    <p:sldId id="270" r:id="rId13"/>
-    <p:sldId id="271" r:id="rId14"/>
-    <p:sldId id="272" r:id="rId15"/>
-    <p:sldId id="273" r:id="rId16"/>
-    <p:sldId id="274" r:id="rId17"/>
-    <p:sldId id="275" r:id="rId18"/>
-    <p:sldId id="276" r:id="rId19"/>
-    <p:sldId id="277" r:id="rId20"/>
-    <p:sldId id="278" r:id="rId21"/>
-    <p:sldId id="279" r:id="rId22"/>
-    <p:sldId id="280" r:id="rId23"/>
-    <p:sldId id="281" r:id="rId24"/>
-    <p:sldId id="282" r:id="rId25"/>
-    <p:sldId id="283" r:id="rId26"/>
-    <p:sldId id="284" r:id="rId27"/>
+    <p:sldId id="269" r:id="rId11"/>
+    <p:sldId id="270" r:id="rId12"/>
+    <p:sldId id="271" r:id="rId13"/>
+    <p:sldId id="272" r:id="rId14"/>
+    <p:sldId id="273" r:id="rId15"/>
+    <p:sldId id="274" r:id="rId16"/>
+    <p:sldId id="275" r:id="rId17"/>
+    <p:sldId id="276" r:id="rId18"/>
+    <p:sldId id="277" r:id="rId19"/>
+    <p:sldId id="278" r:id="rId20"/>
+    <p:sldId id="279" r:id="rId21"/>
+    <p:sldId id="280" r:id="rId22"/>
+    <p:sldId id="281" r:id="rId23"/>
+    <p:sldId id="282" r:id="rId24"/>
+    <p:sldId id="283" r:id="rId25"/>
+    <p:sldId id="284" r:id="rId26"/>
   </p:sldIdLst>
   <p:sldSz cx="9144000" cy="5143500" type="screen16x9"/>
   <p:notesSz cx="6858000" cy="9144000"/>
   <p:embeddedFontLst>
     <p:embeddedFont>
       <p:font typeface="Merriweather" panose="00000500000000000000" pitchFamily="2" charset="-52"/>
-      <p:regular r:id="rId29"/>
-      <p:bold r:id="rId30"/>
-      <p:italic r:id="rId31"/>
-      <p:boldItalic r:id="rId32"/>
+      <p:regular r:id="rId28"/>
+      <p:bold r:id="rId29"/>
+      <p:italic r:id="rId30"/>
+      <p:boldItalic r:id="rId31"/>
     </p:embeddedFont>
     <p:embeddedFont>
       <p:font typeface="Roboto" panose="02000000000000000000" pitchFamily="2" charset="0"/>
-      <p:regular r:id="rId33"/>
-      <p:bold r:id="rId34"/>
-      <p:italic r:id="rId35"/>
-      <p:boldItalic r:id="rId36"/>
+      <p:regular r:id="rId32"/>
+      <p:bold r:id="rId33"/>
+      <p:italic r:id="rId34"/>
+      <p:boldItalic r:id="rId35"/>
     </p:embeddedFont>
   </p:embeddedFontLst>
   <p:defaultTextStyle>
@@ -851,7 +850,7 @@
   <p:cSld>
     <p:spTree>
       <p:nvGrpSpPr>
-        <p:cNvPr id="1" name="Shape 133"/>
+        <p:cNvPr id="1" name="Shape 139"/>
         <p:cNvGrpSpPr/>
         <p:nvPr/>
       </p:nvGrpSpPr>
@@ -865,7 +864,7 @@
       </p:grpSpPr>
       <p:sp>
         <p:nvSpPr>
-          <p:cNvPr id="134" name="Google Shape;134;g2e9e588ebbb_0_139:notes"/>
+          <p:cNvPr id="140" name="Google Shape;140;g2e9e588ebbb_0_111:notes"/>
           <p:cNvSpPr>
             <a:spLocks noGrp="1" noRot="1" noChangeAspect="1"/>
           </p:cNvSpPr>
@@ -906,7 +905,7 @@
       </p:sp>
       <p:sp>
         <p:nvSpPr>
-          <p:cNvPr id="135" name="Google Shape;135;g2e9e588ebbb_0_139:notes"/>
+          <p:cNvPr id="141" name="Google Shape;141;g2e9e588ebbb_0_111:notes"/>
           <p:cNvSpPr txBox="1">
             <a:spLocks noGrp="1"/>
           </p:cNvSpPr>
@@ -951,110 +950,6 @@
 </file>
 
 <file path=ppt/notesSlides/notesSlide11.xml><?xml version="1.0" encoding="utf-8"?>
-<p:notes xmlns:a="http://schemas.openxmlformats.org/drawingml/2006/main" xmlns:r="http://schemas.openxmlformats.org/officeDocument/2006/relationships" xmlns:p="http://schemas.openxmlformats.org/presentationml/2006/main" showMasterSp="0" showMasterPhAnim="0">
-  <p:cSld>
-    <p:spTree>
-      <p:nvGrpSpPr>
-        <p:cNvPr id="1" name="Shape 139"/>
-        <p:cNvGrpSpPr/>
-        <p:nvPr/>
-      </p:nvGrpSpPr>
-      <p:grpSpPr>
-        <a:xfrm>
-          <a:off x="0" y="0"/>
-          <a:ext cx="0" cy="0"/>
-          <a:chOff x="0" y="0"/>
-          <a:chExt cx="0" cy="0"/>
-        </a:xfrm>
-      </p:grpSpPr>
-      <p:sp>
-        <p:nvSpPr>
-          <p:cNvPr id="140" name="Google Shape;140;g2e9e588ebbb_0_111:notes"/>
-          <p:cNvSpPr>
-            <a:spLocks noGrp="1" noRot="1" noChangeAspect="1"/>
-          </p:cNvSpPr>
-          <p:nvPr>
-            <p:ph type="sldImg" idx="2"/>
-          </p:nvPr>
-        </p:nvSpPr>
-        <p:spPr>
-          <a:xfrm>
-            <a:off x="381300" y="685800"/>
-            <a:ext cx="6096000" cy="3429000"/>
-          </a:xfrm>
-          <a:custGeom>
-            <a:avLst/>
-            <a:gdLst/>
-            <a:ahLst/>
-            <a:cxnLst/>
-            <a:rect l="l" t="t" r="r" b="b"/>
-            <a:pathLst>
-              <a:path w="120000" h="120000" extrusionOk="0">
-                <a:moveTo>
-                  <a:pt x="0" y="0"/>
-                </a:moveTo>
-                <a:lnTo>
-                  <a:pt x="120000" y="0"/>
-                </a:lnTo>
-                <a:lnTo>
-                  <a:pt x="120000" y="120000"/>
-                </a:lnTo>
-                <a:lnTo>
-                  <a:pt x="0" y="120000"/>
-                </a:lnTo>
-                <a:close/>
-              </a:path>
-            </a:pathLst>
-          </a:custGeom>
-        </p:spPr>
-      </p:sp>
-      <p:sp>
-        <p:nvSpPr>
-          <p:cNvPr id="141" name="Google Shape;141;g2e9e588ebbb_0_111:notes"/>
-          <p:cNvSpPr txBox="1">
-            <a:spLocks noGrp="1"/>
-          </p:cNvSpPr>
-          <p:nvPr>
-            <p:ph type="body" idx="1"/>
-          </p:nvPr>
-        </p:nvSpPr>
-        <p:spPr>
-          <a:xfrm>
-            <a:off x="685800" y="4343400"/>
-            <a:ext cx="5486400" cy="4114800"/>
-          </a:xfrm>
-          <a:prstGeom prst="rect">
-            <a:avLst/>
-          </a:prstGeom>
-        </p:spPr>
-        <p:txBody>
-          <a:bodyPr spcFirstLastPara="1" wrap="square" lIns="91425" tIns="91425" rIns="91425" bIns="91425" anchor="t" anchorCtr="0">
-            <a:noAutofit/>
-          </a:bodyPr>
-          <a:lstStyle/>
-          <a:p>
-            <a:pPr marL="0" lvl="0" indent="0" algn="l" rtl="0">
-              <a:spcBef>
-                <a:spcPts val="0"/>
-              </a:spcBef>
-              <a:spcAft>
-                <a:spcPts val="0"/>
-              </a:spcAft>
-              <a:buNone/>
-            </a:pPr>
-            <a:endParaRPr/>
-          </a:p>
-        </p:txBody>
-      </p:sp>
-    </p:spTree>
-  </p:cSld>
-  <p:clrMapOvr>
-    <a:masterClrMapping/>
-  </p:clrMapOvr>
-</p:notes>
-</file>
-
-<file path=ppt/notesSlides/notesSlide12.xml><?xml version="1.0" encoding="utf-8"?>
 <p:notes xmlns:a="http://schemas.openxmlformats.org/drawingml/2006/main" xmlns:r="http://schemas.openxmlformats.org/officeDocument/2006/relationships" xmlns:p="http://schemas.openxmlformats.org/presentationml/2006/main" showMasterSp="0" showMasterPhAnim="0">
   <p:cSld>
     <p:spTree>
@@ -1158,7 +1053,7 @@
 </p:notes>
 </file>
 
-<file path=ppt/notesSlides/notesSlide13.xml><?xml version="1.0" encoding="utf-8"?>
+<file path=ppt/notesSlides/notesSlide12.xml><?xml version="1.0" encoding="utf-8"?>
 <p:notes xmlns:a="http://schemas.openxmlformats.org/drawingml/2006/main" xmlns:r="http://schemas.openxmlformats.org/officeDocument/2006/relationships" xmlns:p="http://schemas.openxmlformats.org/presentationml/2006/main" showMasterSp="0" showMasterPhAnim="0">
   <p:cSld>
     <p:spTree>
@@ -1262,7 +1157,7 @@
 </p:notes>
 </file>
 
-<file path=ppt/notesSlides/notesSlide14.xml><?xml version="1.0" encoding="utf-8"?>
+<file path=ppt/notesSlides/notesSlide13.xml><?xml version="1.0" encoding="utf-8"?>
 <p:notes xmlns:a="http://schemas.openxmlformats.org/drawingml/2006/main" xmlns:r="http://schemas.openxmlformats.org/officeDocument/2006/relationships" xmlns:p="http://schemas.openxmlformats.org/presentationml/2006/main" showMasterSp="0" showMasterPhAnim="0">
   <p:cSld>
     <p:spTree>
@@ -1366,7 +1261,7 @@
 </p:notes>
 </file>
 
-<file path=ppt/notesSlides/notesSlide15.xml><?xml version="1.0" encoding="utf-8"?>
+<file path=ppt/notesSlides/notesSlide14.xml><?xml version="1.0" encoding="utf-8"?>
 <p:notes xmlns:a="http://schemas.openxmlformats.org/drawingml/2006/main" xmlns:r="http://schemas.openxmlformats.org/officeDocument/2006/relationships" xmlns:p="http://schemas.openxmlformats.org/presentationml/2006/main" showMasterSp="0" showMasterPhAnim="0">
   <p:cSld>
     <p:spTree>
@@ -1470,7 +1365,7 @@
 </p:notes>
 </file>
 
-<file path=ppt/notesSlides/notesSlide16.xml><?xml version="1.0" encoding="utf-8"?>
+<file path=ppt/notesSlides/notesSlide15.xml><?xml version="1.0" encoding="utf-8"?>
 <p:notes xmlns:a="http://schemas.openxmlformats.org/drawingml/2006/main" xmlns:r="http://schemas.openxmlformats.org/officeDocument/2006/relationships" xmlns:p="http://schemas.openxmlformats.org/presentationml/2006/main" showMasterSp="0" showMasterPhAnim="0">
   <p:cSld>
     <p:spTree>
@@ -1574,7 +1469,7 @@
 </p:notes>
 </file>
 
-<file path=ppt/notesSlides/notesSlide17.xml><?xml version="1.0" encoding="utf-8"?>
+<file path=ppt/notesSlides/notesSlide16.xml><?xml version="1.0" encoding="utf-8"?>
 <p:notes xmlns:a="http://schemas.openxmlformats.org/drawingml/2006/main" xmlns:r="http://schemas.openxmlformats.org/officeDocument/2006/relationships" xmlns:p="http://schemas.openxmlformats.org/presentationml/2006/main" showMasterSp="0" showMasterPhAnim="0">
   <p:cSld>
     <p:spTree>
@@ -1678,7 +1573,7 @@
 </p:notes>
 </file>
 
-<file path=ppt/notesSlides/notesSlide18.xml><?xml version="1.0" encoding="utf-8"?>
+<file path=ppt/notesSlides/notesSlide17.xml><?xml version="1.0" encoding="utf-8"?>
 <p:notes xmlns:a="http://schemas.openxmlformats.org/drawingml/2006/main" xmlns:r="http://schemas.openxmlformats.org/officeDocument/2006/relationships" xmlns:p="http://schemas.openxmlformats.org/presentationml/2006/main" showMasterSp="0" showMasterPhAnim="0">
   <p:cSld>
     <p:spTree>
@@ -1782,7 +1677,7 @@
 </p:notes>
 </file>
 
-<file path=ppt/notesSlides/notesSlide19.xml><?xml version="1.0" encoding="utf-8"?>
+<file path=ppt/notesSlides/notesSlide18.xml><?xml version="1.0" encoding="utf-8"?>
 <p:notes xmlns:a="http://schemas.openxmlformats.org/drawingml/2006/main" xmlns:r="http://schemas.openxmlformats.org/officeDocument/2006/relationships" xmlns:p="http://schemas.openxmlformats.org/presentationml/2006/main" showMasterSp="0" showMasterPhAnim="0">
   <p:cSld>
     <p:spTree>
@@ -1843,6 +1738,110 @@
       <p:sp>
         <p:nvSpPr>
           <p:cNvPr id="189" name="Google Shape;189;g2e9e588ebbb_0_122:notes"/>
+          <p:cNvSpPr txBox="1">
+            <a:spLocks noGrp="1"/>
+          </p:cNvSpPr>
+          <p:nvPr>
+            <p:ph type="body" idx="1"/>
+          </p:nvPr>
+        </p:nvSpPr>
+        <p:spPr>
+          <a:xfrm>
+            <a:off x="685800" y="4343400"/>
+            <a:ext cx="5486400" cy="4114800"/>
+          </a:xfrm>
+          <a:prstGeom prst="rect">
+            <a:avLst/>
+          </a:prstGeom>
+        </p:spPr>
+        <p:txBody>
+          <a:bodyPr spcFirstLastPara="1" wrap="square" lIns="91425" tIns="91425" rIns="91425" bIns="91425" anchor="t" anchorCtr="0">
+            <a:noAutofit/>
+          </a:bodyPr>
+          <a:lstStyle/>
+          <a:p>
+            <a:pPr marL="0" lvl="0" indent="0" algn="l" rtl="0">
+              <a:spcBef>
+                <a:spcPts val="0"/>
+              </a:spcBef>
+              <a:spcAft>
+                <a:spcPts val="0"/>
+              </a:spcAft>
+              <a:buNone/>
+            </a:pPr>
+            <a:endParaRPr/>
+          </a:p>
+        </p:txBody>
+      </p:sp>
+    </p:spTree>
+  </p:cSld>
+  <p:clrMapOvr>
+    <a:masterClrMapping/>
+  </p:clrMapOvr>
+</p:notes>
+</file>
+
+<file path=ppt/notesSlides/notesSlide19.xml><?xml version="1.0" encoding="utf-8"?>
+<p:notes xmlns:a="http://schemas.openxmlformats.org/drawingml/2006/main" xmlns:r="http://schemas.openxmlformats.org/officeDocument/2006/relationships" xmlns:p="http://schemas.openxmlformats.org/presentationml/2006/main" showMasterSp="0" showMasterPhAnim="0">
+  <p:cSld>
+    <p:spTree>
+      <p:nvGrpSpPr>
+        <p:cNvPr id="1" name="Shape 192"/>
+        <p:cNvGrpSpPr/>
+        <p:nvPr/>
+      </p:nvGrpSpPr>
+      <p:grpSpPr>
+        <a:xfrm>
+          <a:off x="0" y="0"/>
+          <a:ext cx="0" cy="0"/>
+          <a:chOff x="0" y="0"/>
+          <a:chExt cx="0" cy="0"/>
+        </a:xfrm>
+      </p:grpSpPr>
+      <p:sp>
+        <p:nvSpPr>
+          <p:cNvPr id="193" name="Google Shape;193;g2e9e588ebbb_0_193:notes"/>
+          <p:cNvSpPr>
+            <a:spLocks noGrp="1" noRot="1" noChangeAspect="1"/>
+          </p:cNvSpPr>
+          <p:nvPr>
+            <p:ph type="sldImg" idx="2"/>
+          </p:nvPr>
+        </p:nvSpPr>
+        <p:spPr>
+          <a:xfrm>
+            <a:off x="381300" y="685800"/>
+            <a:ext cx="6096000" cy="3429000"/>
+          </a:xfrm>
+          <a:custGeom>
+            <a:avLst/>
+            <a:gdLst/>
+            <a:ahLst/>
+            <a:cxnLst/>
+            <a:rect l="l" t="t" r="r" b="b"/>
+            <a:pathLst>
+              <a:path w="120000" h="120000" extrusionOk="0">
+                <a:moveTo>
+                  <a:pt x="0" y="0"/>
+                </a:moveTo>
+                <a:lnTo>
+                  <a:pt x="120000" y="0"/>
+                </a:lnTo>
+                <a:lnTo>
+                  <a:pt x="120000" y="120000"/>
+                </a:lnTo>
+                <a:lnTo>
+                  <a:pt x="0" y="120000"/>
+                </a:lnTo>
+                <a:close/>
+              </a:path>
+            </a:pathLst>
+          </a:custGeom>
+        </p:spPr>
+      </p:sp>
+      <p:sp>
+        <p:nvSpPr>
+          <p:cNvPr id="194" name="Google Shape;194;g2e9e588ebbb_0_193:notes"/>
           <p:cNvSpPr txBox="1">
             <a:spLocks noGrp="1"/>
           </p:cNvSpPr>
@@ -1995,7 +1994,7 @@
   <p:cSld>
     <p:spTree>
       <p:nvGrpSpPr>
-        <p:cNvPr id="1" name="Shape 192"/>
+        <p:cNvPr id="1" name="Shape 198"/>
         <p:cNvGrpSpPr/>
         <p:nvPr/>
       </p:nvGrpSpPr>
@@ -2009,7 +2008,7 @@
       </p:grpSpPr>
       <p:sp>
         <p:nvSpPr>
-          <p:cNvPr id="193" name="Google Shape;193;g2e9e588ebbb_0_193:notes"/>
+          <p:cNvPr id="199" name="Google Shape;199;g2e9e588ebbb_0_133:notes"/>
           <p:cNvSpPr>
             <a:spLocks noGrp="1" noRot="1" noChangeAspect="1"/>
           </p:cNvSpPr>
@@ -2050,7 +2049,7 @@
       </p:sp>
       <p:sp>
         <p:nvSpPr>
-          <p:cNvPr id="194" name="Google Shape;194;g2e9e588ebbb_0_193:notes"/>
+          <p:cNvPr id="200" name="Google Shape;200;g2e9e588ebbb_0_133:notes"/>
           <p:cNvSpPr txBox="1">
             <a:spLocks noGrp="1"/>
           </p:cNvSpPr>
@@ -2095,110 +2094,6 @@
 </file>
 
 <file path=ppt/notesSlides/notesSlide21.xml><?xml version="1.0" encoding="utf-8"?>
-<p:notes xmlns:a="http://schemas.openxmlformats.org/drawingml/2006/main" xmlns:r="http://schemas.openxmlformats.org/officeDocument/2006/relationships" xmlns:p="http://schemas.openxmlformats.org/presentationml/2006/main" showMasterSp="0" showMasterPhAnim="0">
-  <p:cSld>
-    <p:spTree>
-      <p:nvGrpSpPr>
-        <p:cNvPr id="1" name="Shape 198"/>
-        <p:cNvGrpSpPr/>
-        <p:nvPr/>
-      </p:nvGrpSpPr>
-      <p:grpSpPr>
-        <a:xfrm>
-          <a:off x="0" y="0"/>
-          <a:ext cx="0" cy="0"/>
-          <a:chOff x="0" y="0"/>
-          <a:chExt cx="0" cy="0"/>
-        </a:xfrm>
-      </p:grpSpPr>
-      <p:sp>
-        <p:nvSpPr>
-          <p:cNvPr id="199" name="Google Shape;199;g2e9e588ebbb_0_133:notes"/>
-          <p:cNvSpPr>
-            <a:spLocks noGrp="1" noRot="1" noChangeAspect="1"/>
-          </p:cNvSpPr>
-          <p:nvPr>
-            <p:ph type="sldImg" idx="2"/>
-          </p:nvPr>
-        </p:nvSpPr>
-        <p:spPr>
-          <a:xfrm>
-            <a:off x="381300" y="685800"/>
-            <a:ext cx="6096000" cy="3429000"/>
-          </a:xfrm>
-          <a:custGeom>
-            <a:avLst/>
-            <a:gdLst/>
-            <a:ahLst/>
-            <a:cxnLst/>
-            <a:rect l="l" t="t" r="r" b="b"/>
-            <a:pathLst>
-              <a:path w="120000" h="120000" extrusionOk="0">
-                <a:moveTo>
-                  <a:pt x="0" y="0"/>
-                </a:moveTo>
-                <a:lnTo>
-                  <a:pt x="120000" y="0"/>
-                </a:lnTo>
-                <a:lnTo>
-                  <a:pt x="120000" y="120000"/>
-                </a:lnTo>
-                <a:lnTo>
-                  <a:pt x="0" y="120000"/>
-                </a:lnTo>
-                <a:close/>
-              </a:path>
-            </a:pathLst>
-          </a:custGeom>
-        </p:spPr>
-      </p:sp>
-      <p:sp>
-        <p:nvSpPr>
-          <p:cNvPr id="200" name="Google Shape;200;g2e9e588ebbb_0_133:notes"/>
-          <p:cNvSpPr txBox="1">
-            <a:spLocks noGrp="1"/>
-          </p:cNvSpPr>
-          <p:nvPr>
-            <p:ph type="body" idx="1"/>
-          </p:nvPr>
-        </p:nvSpPr>
-        <p:spPr>
-          <a:xfrm>
-            <a:off x="685800" y="4343400"/>
-            <a:ext cx="5486400" cy="4114800"/>
-          </a:xfrm>
-          <a:prstGeom prst="rect">
-            <a:avLst/>
-          </a:prstGeom>
-        </p:spPr>
-        <p:txBody>
-          <a:bodyPr spcFirstLastPara="1" wrap="square" lIns="91425" tIns="91425" rIns="91425" bIns="91425" anchor="t" anchorCtr="0">
-            <a:noAutofit/>
-          </a:bodyPr>
-          <a:lstStyle/>
-          <a:p>
-            <a:pPr marL="0" lvl="0" indent="0" algn="l" rtl="0">
-              <a:spcBef>
-                <a:spcPts val="0"/>
-              </a:spcBef>
-              <a:spcAft>
-                <a:spcPts val="0"/>
-              </a:spcAft>
-              <a:buNone/>
-            </a:pPr>
-            <a:endParaRPr/>
-          </a:p>
-        </p:txBody>
-      </p:sp>
-    </p:spTree>
-  </p:cSld>
-  <p:clrMapOvr>
-    <a:masterClrMapping/>
-  </p:clrMapOvr>
-</p:notes>
-</file>
-
-<file path=ppt/notesSlides/notesSlide22.xml><?xml version="1.0" encoding="utf-8"?>
 <p:notes xmlns:a="http://schemas.openxmlformats.org/drawingml/2006/main" xmlns:r="http://schemas.openxmlformats.org/officeDocument/2006/relationships" xmlns:p="http://schemas.openxmlformats.org/presentationml/2006/main" showMasterSp="0" showMasterPhAnim="0">
   <p:cSld>
     <p:spTree>
@@ -2302,7 +2197,7 @@
 </p:notes>
 </file>
 
-<file path=ppt/notesSlides/notesSlide23.xml><?xml version="1.0" encoding="utf-8"?>
+<file path=ppt/notesSlides/notesSlide22.xml><?xml version="1.0" encoding="utf-8"?>
 <p:notes xmlns:a="http://schemas.openxmlformats.org/drawingml/2006/main" xmlns:r="http://schemas.openxmlformats.org/officeDocument/2006/relationships" xmlns:p="http://schemas.openxmlformats.org/presentationml/2006/main" showMasterSp="0" showMasterPhAnim="0">
   <p:cSld>
     <p:spTree>
@@ -2406,7 +2301,7 @@
 </p:notes>
 </file>
 
-<file path=ppt/notesSlides/notesSlide24.xml><?xml version="1.0" encoding="utf-8"?>
+<file path=ppt/notesSlides/notesSlide23.xml><?xml version="1.0" encoding="utf-8"?>
 <p:notes xmlns:a="http://schemas.openxmlformats.org/drawingml/2006/main" xmlns:r="http://schemas.openxmlformats.org/officeDocument/2006/relationships" xmlns:p="http://schemas.openxmlformats.org/presentationml/2006/main" showMasterSp="0" showMasterPhAnim="0">
   <p:cSld>
     <p:spTree>
@@ -2510,7 +2405,7 @@
 </p:notes>
 </file>
 
-<file path=ppt/notesSlides/notesSlide25.xml><?xml version="1.0" encoding="utf-8"?>
+<file path=ppt/notesSlides/notesSlide24.xml><?xml version="1.0" encoding="utf-8"?>
 <p:notes xmlns:a="http://schemas.openxmlformats.org/drawingml/2006/main" xmlns:r="http://schemas.openxmlformats.org/officeDocument/2006/relationships" xmlns:p="http://schemas.openxmlformats.org/presentationml/2006/main" showMasterSp="0" showMasterPhAnim="0">
   <p:cSld>
     <p:spTree>
@@ -2614,7 +2509,7 @@
 </p:notes>
 </file>
 
-<file path=ppt/notesSlides/notesSlide26.xml><?xml version="1.0" encoding="utf-8"?>
+<file path=ppt/notesSlides/notesSlide25.xml><?xml version="1.0" encoding="utf-8"?>
 <p:notes xmlns:a="http://schemas.openxmlformats.org/drawingml/2006/main" xmlns:r="http://schemas.openxmlformats.org/officeDocument/2006/relationships" xmlns:p="http://schemas.openxmlformats.org/presentationml/2006/main" showMasterSp="0" showMasterPhAnim="0">
   <p:cSld>
     <p:spTree>
@@ -3139,7 +3034,7 @@
   <p:cSld>
     <p:spTree>
       <p:nvGrpSpPr>
-        <p:cNvPr id="1" name="Shape 108"/>
+        <p:cNvPr id="1" name="Shape 133"/>
         <p:cNvGrpSpPr/>
         <p:nvPr/>
       </p:nvGrpSpPr>
@@ -3153,7 +3048,7 @@
       </p:grpSpPr>
       <p:sp>
         <p:nvSpPr>
-          <p:cNvPr id="109" name="Google Shape;109;g2e9e588ebbb_0_81:notes"/>
+          <p:cNvPr id="134" name="Google Shape;134;g2e9e588ebbb_0_139:notes"/>
           <p:cNvSpPr>
             <a:spLocks noGrp="1" noRot="1" noChangeAspect="1"/>
           </p:cNvSpPr>
@@ -3163,7 +3058,7 @@
         </p:nvSpPr>
         <p:spPr>
           <a:xfrm>
-            <a:off x="381300" y="685800"/>
+            <a:off x="381000" y="685800"/>
             <a:ext cx="6096000" cy="3429000"/>
           </a:xfrm>
           <a:custGeom>
@@ -3194,7 +3089,7 @@
       </p:sp>
       <p:sp>
         <p:nvSpPr>
-          <p:cNvPr id="110" name="Google Shape;110;g2e9e588ebbb_0_81:notes"/>
+          <p:cNvPr id="135" name="Google Shape;135;g2e9e588ebbb_0_139:notes"/>
           <p:cNvSpPr txBox="1">
             <a:spLocks noGrp="1"/>
           </p:cNvSpPr>
@@ -3267,7 +3162,7 @@
         </p:nvSpPr>
         <p:spPr>
           <a:xfrm>
-            <a:off x="381300" y="685800"/>
+            <a:off x="381000" y="685800"/>
             <a:ext cx="6096000" cy="3429000"/>
           </a:xfrm>
           <a:custGeom>
@@ -9833,259 +9728,6 @@
   <p:cSld>
     <p:spTree>
       <p:nvGrpSpPr>
-        <p:cNvPr id="1" name="Shape 136"/>
-        <p:cNvGrpSpPr/>
-        <p:nvPr/>
-      </p:nvGrpSpPr>
-      <p:grpSpPr>
-        <a:xfrm>
-          <a:off x="0" y="0"/>
-          <a:ext cx="0" cy="0"/>
-          <a:chOff x="0" y="0"/>
-          <a:chExt cx="0" cy="0"/>
-        </a:xfrm>
-      </p:grpSpPr>
-      <p:sp>
-        <p:nvSpPr>
-          <p:cNvPr id="137" name="Google Shape;137;p25"/>
-          <p:cNvSpPr txBox="1">
-            <a:spLocks noGrp="1"/>
-          </p:cNvSpPr>
-          <p:nvPr>
-            <p:ph type="title"/>
-          </p:nvPr>
-        </p:nvSpPr>
-        <p:spPr>
-          <a:xfrm>
-            <a:off x="311725" y="500925"/>
-            <a:ext cx="8520600" cy="623700"/>
-          </a:xfrm>
-          <a:prstGeom prst="rect">
-            <a:avLst/>
-          </a:prstGeom>
-        </p:spPr>
-        <p:txBody>
-          <a:bodyPr spcFirstLastPara="1" wrap="square" lIns="91425" tIns="91425" rIns="91425" bIns="91425" anchor="t" anchorCtr="0">
-            <a:normAutofit/>
-          </a:bodyPr>
-          <a:lstStyle/>
-          <a:p>
-            <a:pPr marL="0" lvl="0" indent="0" algn="l" rtl="0">
-              <a:spcBef>
-                <a:spcPts val="0"/>
-              </a:spcBef>
-              <a:spcAft>
-                <a:spcPts val="0"/>
-              </a:spcAft>
-              <a:buNone/>
-            </a:pPr>
-            <a:r>
-              <a:rPr lang="en"/>
-              <a:t>Проблеми със съществуващите решения</a:t>
-            </a:r>
-            <a:endParaRPr/>
-          </a:p>
-        </p:txBody>
-      </p:sp>
-      <p:sp>
-        <p:nvSpPr>
-          <p:cNvPr id="138" name="Google Shape;138;p25"/>
-          <p:cNvSpPr txBox="1"/>
-          <p:nvPr/>
-        </p:nvSpPr>
-        <p:spPr>
-          <a:xfrm>
-            <a:off x="802950" y="1886475"/>
-            <a:ext cx="7538100" cy="2202300"/>
-          </a:xfrm>
-          <a:prstGeom prst="rect">
-            <a:avLst/>
-          </a:prstGeom>
-          <a:noFill/>
-          <a:ln>
-            <a:noFill/>
-          </a:ln>
-        </p:spPr>
-        <p:txBody>
-          <a:bodyPr spcFirstLastPara="1" wrap="square" lIns="91425" tIns="91425" rIns="91425" bIns="91425" anchor="t" anchorCtr="0">
-            <a:noAutofit/>
-          </a:bodyPr>
-          <a:lstStyle/>
-          <a:p>
-            <a:pPr marL="457200" lvl="0" indent="-381000" algn="l" rtl="0">
-              <a:lnSpc>
-                <a:spcPct val="150000"/>
-              </a:lnSpc>
-              <a:spcBef>
-                <a:spcPts val="0"/>
-              </a:spcBef>
-              <a:spcAft>
-                <a:spcPts val="0"/>
-              </a:spcAft>
-              <a:buClr>
-                <a:schemeClr val="dk1"/>
-              </a:buClr>
-              <a:buSzPts val="2400"/>
-              <a:buFont typeface="Roboto"/>
-              <a:buChar char="●"/>
-            </a:pPr>
-            <a:r>
-              <a:rPr lang="en" sz="2400" dirty="0">
-                <a:solidFill>
-                  <a:schemeClr val="dk1"/>
-                </a:solidFill>
-                <a:latin typeface="Roboto"/>
-                <a:ea typeface="Roboto"/>
-                <a:cs typeface="Roboto"/>
-                <a:sym typeface="Roboto"/>
-              </a:rPr>
-              <a:t>Бавно семплиране - обикновено до няколко Hz</a:t>
-            </a:r>
-            <a:endParaRPr sz="2400" dirty="0">
-              <a:solidFill>
-                <a:schemeClr val="dk1"/>
-              </a:solidFill>
-              <a:latin typeface="Roboto"/>
-              <a:ea typeface="Roboto"/>
-              <a:cs typeface="Roboto"/>
-              <a:sym typeface="Roboto"/>
-            </a:endParaRPr>
-          </a:p>
-          <a:p>
-            <a:pPr marL="457200" lvl="0" indent="-381000" algn="l" rtl="0">
-              <a:lnSpc>
-                <a:spcPct val="150000"/>
-              </a:lnSpc>
-              <a:spcBef>
-                <a:spcPts val="0"/>
-              </a:spcBef>
-              <a:spcAft>
-                <a:spcPts val="0"/>
-              </a:spcAft>
-              <a:buClr>
-                <a:schemeClr val="dk1"/>
-              </a:buClr>
-              <a:buSzPts val="2400"/>
-              <a:buFont typeface="Roboto"/>
-              <a:buChar char="●"/>
-            </a:pPr>
-            <a:r>
-              <a:rPr lang="en" sz="2400" dirty="0">
-                <a:solidFill>
-                  <a:schemeClr val="dk1"/>
-                </a:solidFill>
-                <a:latin typeface="Roboto"/>
-                <a:ea typeface="Roboto"/>
-                <a:cs typeface="Roboto"/>
-                <a:sym typeface="Roboto"/>
-              </a:rPr>
-              <a:t>Висока цена</a:t>
-            </a:r>
-            <a:endParaRPr sz="2400" dirty="0">
-              <a:solidFill>
-                <a:schemeClr val="dk1"/>
-              </a:solidFill>
-              <a:latin typeface="Roboto"/>
-              <a:ea typeface="Roboto"/>
-              <a:cs typeface="Roboto"/>
-              <a:sym typeface="Roboto"/>
-            </a:endParaRPr>
-          </a:p>
-          <a:p>
-            <a:pPr marL="457200" lvl="0" indent="-381000" algn="l" rtl="0">
-              <a:lnSpc>
-                <a:spcPct val="150000"/>
-              </a:lnSpc>
-              <a:spcBef>
-                <a:spcPts val="0"/>
-              </a:spcBef>
-              <a:spcAft>
-                <a:spcPts val="0"/>
-              </a:spcAft>
-              <a:buClr>
-                <a:schemeClr val="dk1"/>
-              </a:buClr>
-              <a:buSzPts val="2400"/>
-              <a:buFont typeface="Roboto"/>
-              <a:buChar char="●"/>
-            </a:pPr>
-            <a:r>
-              <a:rPr lang="en" sz="2400" dirty="0">
-                <a:solidFill>
-                  <a:schemeClr val="dk1"/>
-                </a:solidFill>
-                <a:latin typeface="Roboto"/>
-                <a:ea typeface="Roboto"/>
-                <a:cs typeface="Roboto"/>
-                <a:sym typeface="Roboto"/>
-              </a:rPr>
-              <a:t>Липса на филтрация на входовете</a:t>
-            </a:r>
-            <a:endParaRPr sz="2400" dirty="0">
-              <a:solidFill>
-                <a:schemeClr val="dk1"/>
-              </a:solidFill>
-              <a:latin typeface="Roboto"/>
-              <a:ea typeface="Roboto"/>
-              <a:cs typeface="Roboto"/>
-              <a:sym typeface="Roboto"/>
-            </a:endParaRPr>
-          </a:p>
-          <a:p>
-            <a:pPr marL="457200" lvl="0" indent="-381000" algn="l" rtl="0">
-              <a:lnSpc>
-                <a:spcPct val="150000"/>
-              </a:lnSpc>
-              <a:spcBef>
-                <a:spcPts val="0"/>
-              </a:spcBef>
-              <a:spcAft>
-                <a:spcPts val="0"/>
-              </a:spcAft>
-              <a:buClr>
-                <a:schemeClr val="dk1"/>
-              </a:buClr>
-              <a:buSzPts val="2400"/>
-              <a:buFont typeface="Roboto"/>
-              <a:buChar char="●"/>
-            </a:pPr>
-            <a:r>
-              <a:rPr lang="en" sz="2400" dirty="0">
-                <a:solidFill>
-                  <a:schemeClr val="dk1"/>
-                </a:solidFill>
-                <a:latin typeface="Roboto"/>
-                <a:ea typeface="Roboto"/>
-                <a:cs typeface="Roboto"/>
-                <a:sym typeface="Roboto"/>
-              </a:rPr>
-              <a:t>Частично решение - неизгодно</a:t>
-            </a:r>
-            <a:endParaRPr sz="2400" dirty="0">
-              <a:solidFill>
-                <a:schemeClr val="dk1"/>
-              </a:solidFill>
-              <a:latin typeface="Roboto"/>
-              <a:ea typeface="Roboto"/>
-              <a:cs typeface="Roboto"/>
-              <a:sym typeface="Roboto"/>
-            </a:endParaRPr>
-          </a:p>
-        </p:txBody>
-      </p:sp>
-    </p:spTree>
-  </p:cSld>
-  <p:clrMapOvr>
-    <a:masterClrMapping/>
-  </p:clrMapOvr>
-</p:sld>
-</file>
-
-<file path=ppt/slides/slide11.xml><?xml version="1.0" encoding="utf-8"?>
-<p:sld xmlns:a="http://schemas.openxmlformats.org/drawingml/2006/main" xmlns:r="http://schemas.openxmlformats.org/officeDocument/2006/relationships" xmlns:p="http://schemas.openxmlformats.org/presentationml/2006/main">
-  <p:cSld>
-    <p:spTree>
-      <p:nvGrpSpPr>
         <p:cNvPr id="1" name="Shape 142"/>
         <p:cNvGrpSpPr/>
         <p:nvPr/>
@@ -10148,7 +9790,7 @@
 </p:sld>
 </file>
 
-<file path=ppt/slides/slide12.xml><?xml version="1.0" encoding="utf-8"?>
+<file path=ppt/slides/slide11.xml><?xml version="1.0" encoding="utf-8"?>
 <p:sld xmlns:a="http://schemas.openxmlformats.org/drawingml/2006/main" xmlns:r="http://schemas.openxmlformats.org/officeDocument/2006/relationships" xmlns:p="http://schemas.openxmlformats.org/presentationml/2006/main">
   <p:cSld>
     <p:spTree>
@@ -10243,7 +9885,7 @@
 </p:sld>
 </file>
 
-<file path=ppt/slides/slide13.xml><?xml version="1.0" encoding="utf-8"?>
+<file path=ppt/slides/slide12.xml><?xml version="1.0" encoding="utf-8"?>
 <p:sld xmlns:a="http://schemas.openxmlformats.org/drawingml/2006/main" xmlns:r="http://schemas.openxmlformats.org/officeDocument/2006/relationships" xmlns:p="http://schemas.openxmlformats.org/presentationml/2006/main">
   <p:cSld>
     <p:spTree>
@@ -10337,7 +9979,7 @@
 </p:sld>
 </file>
 
-<file path=ppt/slides/slide14.xml><?xml version="1.0" encoding="utf-8"?>
+<file path=ppt/slides/slide13.xml><?xml version="1.0" encoding="utf-8"?>
 <p:sld xmlns:a="http://schemas.openxmlformats.org/drawingml/2006/main" xmlns:r="http://schemas.openxmlformats.org/officeDocument/2006/relationships" xmlns:p="http://schemas.openxmlformats.org/presentationml/2006/main">
   <p:cSld>
     <p:spTree>
@@ -10432,7 +10074,7 @@
 </p:sld>
 </file>
 
-<file path=ppt/slides/slide15.xml><?xml version="1.0" encoding="utf-8"?>
+<file path=ppt/slides/slide14.xml><?xml version="1.0" encoding="utf-8"?>
 <p:sld xmlns:a="http://schemas.openxmlformats.org/drawingml/2006/main" xmlns:r="http://schemas.openxmlformats.org/officeDocument/2006/relationships" xmlns:p="http://schemas.openxmlformats.org/presentationml/2006/main">
   <p:cSld>
     <p:spTree>
@@ -10549,7 +10191,7 @@
 </p:sld>
 </file>
 
-<file path=ppt/slides/slide16.xml><?xml version="1.0" encoding="utf-8"?>
+<file path=ppt/slides/slide15.xml><?xml version="1.0" encoding="utf-8"?>
 <p:sld xmlns:a="http://schemas.openxmlformats.org/drawingml/2006/main" xmlns:r="http://schemas.openxmlformats.org/officeDocument/2006/relationships" xmlns:p="http://schemas.openxmlformats.org/presentationml/2006/main">
   <p:cSld>
     <p:spTree>
@@ -10694,7 +10336,7 @@
 </p:sld>
 </file>
 
-<file path=ppt/slides/slide17.xml><?xml version="1.0" encoding="utf-8"?>
+<file path=ppt/slides/slide16.xml><?xml version="1.0" encoding="utf-8"?>
 <p:sld xmlns:a="http://schemas.openxmlformats.org/drawingml/2006/main" xmlns:r="http://schemas.openxmlformats.org/officeDocument/2006/relationships" xmlns:p="http://schemas.openxmlformats.org/presentationml/2006/main">
   <p:cSld>
     <p:spTree>
@@ -10811,7 +10453,7 @@
 </p:sld>
 </file>
 
-<file path=ppt/slides/slide18.xml><?xml version="1.0" encoding="utf-8"?>
+<file path=ppt/slides/slide17.xml><?xml version="1.0" encoding="utf-8"?>
 <p:sld xmlns:a="http://schemas.openxmlformats.org/drawingml/2006/main" xmlns:r="http://schemas.openxmlformats.org/officeDocument/2006/relationships" xmlns:p="http://schemas.openxmlformats.org/presentationml/2006/main">
   <p:cSld>
     <p:spTree>
@@ -10906,7 +10548,7 @@
 </p:sld>
 </file>
 
-<file path=ppt/slides/slide19.xml><?xml version="1.0" encoding="utf-8"?>
+<file path=ppt/slides/slide18.xml><?xml version="1.0" encoding="utf-8"?>
 <p:sld xmlns:a="http://schemas.openxmlformats.org/drawingml/2006/main" xmlns:r="http://schemas.openxmlformats.org/officeDocument/2006/relationships" xmlns:p="http://schemas.openxmlformats.org/presentationml/2006/main">
   <p:cSld>
     <p:spTree>
@@ -10965,6 +10607,100 @@
           </a:p>
         </p:txBody>
       </p:sp>
+    </p:spTree>
+  </p:cSld>
+  <p:clrMapOvr>
+    <a:masterClrMapping/>
+  </p:clrMapOvr>
+</p:sld>
+</file>
+
+<file path=ppt/slides/slide19.xml><?xml version="1.0" encoding="utf-8"?>
+<p:sld xmlns:a="http://schemas.openxmlformats.org/drawingml/2006/main" xmlns:r="http://schemas.openxmlformats.org/officeDocument/2006/relationships" xmlns:p="http://schemas.openxmlformats.org/presentationml/2006/main">
+  <p:cSld>
+    <p:spTree>
+      <p:nvGrpSpPr>
+        <p:cNvPr id="1" name="Shape 195"/>
+        <p:cNvGrpSpPr/>
+        <p:nvPr/>
+      </p:nvGrpSpPr>
+      <p:grpSpPr>
+        <a:xfrm>
+          <a:off x="0" y="0"/>
+          <a:ext cx="0" cy="0"/>
+          <a:chOff x="0" y="0"/>
+          <a:chExt cx="0" cy="0"/>
+        </a:xfrm>
+      </p:grpSpPr>
+      <p:sp>
+        <p:nvSpPr>
+          <p:cNvPr id="196" name="Google Shape;196;p35"/>
+          <p:cNvSpPr txBox="1">
+            <a:spLocks noGrp="1"/>
+          </p:cNvSpPr>
+          <p:nvPr>
+            <p:ph type="title"/>
+          </p:nvPr>
+        </p:nvSpPr>
+        <p:spPr>
+          <a:xfrm>
+            <a:off x="311725" y="500925"/>
+            <a:ext cx="8520600" cy="623700"/>
+          </a:xfrm>
+          <a:prstGeom prst="rect">
+            <a:avLst/>
+          </a:prstGeom>
+        </p:spPr>
+        <p:txBody>
+          <a:bodyPr spcFirstLastPara="1" wrap="square" lIns="91425" tIns="91425" rIns="91425" bIns="91425" anchor="t" anchorCtr="0">
+            <a:normAutofit/>
+          </a:bodyPr>
+          <a:lstStyle/>
+          <a:p>
+            <a:pPr marL="0" lvl="0" indent="0" algn="l" rtl="0">
+              <a:spcBef>
+                <a:spcPts val="0"/>
+              </a:spcBef>
+              <a:spcAft>
+                <a:spcPts val="0"/>
+              </a:spcAft>
+              <a:buNone/>
+            </a:pPr>
+            <a:r>
+              <a:rPr lang="en"/>
+              <a:t>Наситена печатна платка</a:t>
+            </a:r>
+            <a:endParaRPr/>
+          </a:p>
+        </p:txBody>
+      </p:sp>
+      <p:pic>
+        <p:nvPicPr>
+          <p:cNvPr id="197" name="Google Shape;197;p35"/>
+          <p:cNvPicPr preferRelativeResize="0"/>
+          <p:nvPr/>
+        </p:nvPicPr>
+        <p:blipFill rotWithShape="1">
+          <a:blip r:embed="rId3">
+            <a:alphaModFix/>
+          </a:blip>
+          <a:srcRect l="3438" t="8834" r="1576" b="7901"/>
+          <a:stretch/>
+        </p:blipFill>
+        <p:spPr>
+          <a:xfrm>
+            <a:off x="1740963" y="1347125"/>
+            <a:ext cx="5662075" cy="3722749"/>
+          </a:xfrm>
+          <a:prstGeom prst="rect">
+            <a:avLst/>
+          </a:prstGeom>
+          <a:noFill/>
+          <a:ln>
+            <a:noFill/>
+          </a:ln>
+        </p:spPr>
+      </p:pic>
     </p:spTree>
   </p:cSld>
   <p:clrMapOvr>
@@ -11046,100 +10782,6 @@
   <p:cSld>
     <p:spTree>
       <p:nvGrpSpPr>
-        <p:cNvPr id="1" name="Shape 195"/>
-        <p:cNvGrpSpPr/>
-        <p:nvPr/>
-      </p:nvGrpSpPr>
-      <p:grpSpPr>
-        <a:xfrm>
-          <a:off x="0" y="0"/>
-          <a:ext cx="0" cy="0"/>
-          <a:chOff x="0" y="0"/>
-          <a:chExt cx="0" cy="0"/>
-        </a:xfrm>
-      </p:grpSpPr>
-      <p:sp>
-        <p:nvSpPr>
-          <p:cNvPr id="196" name="Google Shape;196;p35"/>
-          <p:cNvSpPr txBox="1">
-            <a:spLocks noGrp="1"/>
-          </p:cNvSpPr>
-          <p:nvPr>
-            <p:ph type="title"/>
-          </p:nvPr>
-        </p:nvSpPr>
-        <p:spPr>
-          <a:xfrm>
-            <a:off x="311725" y="500925"/>
-            <a:ext cx="8520600" cy="623700"/>
-          </a:xfrm>
-          <a:prstGeom prst="rect">
-            <a:avLst/>
-          </a:prstGeom>
-        </p:spPr>
-        <p:txBody>
-          <a:bodyPr spcFirstLastPara="1" wrap="square" lIns="91425" tIns="91425" rIns="91425" bIns="91425" anchor="t" anchorCtr="0">
-            <a:normAutofit/>
-          </a:bodyPr>
-          <a:lstStyle/>
-          <a:p>
-            <a:pPr marL="0" lvl="0" indent="0" algn="l" rtl="0">
-              <a:spcBef>
-                <a:spcPts val="0"/>
-              </a:spcBef>
-              <a:spcAft>
-                <a:spcPts val="0"/>
-              </a:spcAft>
-              <a:buNone/>
-            </a:pPr>
-            <a:r>
-              <a:rPr lang="en"/>
-              <a:t>Наситена печатна платка</a:t>
-            </a:r>
-            <a:endParaRPr/>
-          </a:p>
-        </p:txBody>
-      </p:sp>
-      <p:pic>
-        <p:nvPicPr>
-          <p:cNvPr id="197" name="Google Shape;197;p35"/>
-          <p:cNvPicPr preferRelativeResize="0"/>
-          <p:nvPr/>
-        </p:nvPicPr>
-        <p:blipFill rotWithShape="1">
-          <a:blip r:embed="rId3">
-            <a:alphaModFix/>
-          </a:blip>
-          <a:srcRect l="3438" t="8834" r="1576" b="7901"/>
-          <a:stretch/>
-        </p:blipFill>
-        <p:spPr>
-          <a:xfrm>
-            <a:off x="1740963" y="1347125"/>
-            <a:ext cx="5662075" cy="3722749"/>
-          </a:xfrm>
-          <a:prstGeom prst="rect">
-            <a:avLst/>
-          </a:prstGeom>
-          <a:noFill/>
-          <a:ln>
-            <a:noFill/>
-          </a:ln>
-        </p:spPr>
-      </p:pic>
-    </p:spTree>
-  </p:cSld>
-  <p:clrMapOvr>
-    <a:masterClrMapping/>
-  </p:clrMapOvr>
-</p:sld>
-</file>
-
-<file path=ppt/slides/slide21.xml><?xml version="1.0" encoding="utf-8"?>
-<p:sld xmlns:a="http://schemas.openxmlformats.org/drawingml/2006/main" xmlns:r="http://schemas.openxmlformats.org/officeDocument/2006/relationships" xmlns:p="http://schemas.openxmlformats.org/presentationml/2006/main">
-  <p:cSld>
-    <p:spTree>
-      <p:nvGrpSpPr>
         <p:cNvPr id="1" name="Shape 201"/>
         <p:cNvGrpSpPr/>
         <p:nvPr/>
@@ -11230,7 +10872,7 @@
 </p:sld>
 </file>
 
-<file path=ppt/slides/slide22.xml><?xml version="1.0" encoding="utf-8"?>
+<file path=ppt/slides/slide21.xml><?xml version="1.0" encoding="utf-8"?>
 <p:sld xmlns:a="http://schemas.openxmlformats.org/drawingml/2006/main" xmlns:r="http://schemas.openxmlformats.org/officeDocument/2006/relationships" xmlns:p="http://schemas.openxmlformats.org/presentationml/2006/main">
   <p:cSld>
     <p:spTree>
@@ -11324,7 +10966,7 @@
 </p:sld>
 </file>
 
-<file path=ppt/slides/slide23.xml><?xml version="1.0" encoding="utf-8"?>
+<file path=ppt/slides/slide22.xml><?xml version="1.0" encoding="utf-8"?>
 <p:sld xmlns:a="http://schemas.openxmlformats.org/drawingml/2006/main" xmlns:r="http://schemas.openxmlformats.org/officeDocument/2006/relationships" xmlns:p="http://schemas.openxmlformats.org/presentationml/2006/main">
   <p:cSld>
     <p:spTree>
@@ -11391,7 +11033,7 @@
 </p:sld>
 </file>
 
-<file path=ppt/slides/slide24.xml><?xml version="1.0" encoding="utf-8"?>
+<file path=ppt/slides/slide23.xml><?xml version="1.0" encoding="utf-8"?>
 <p:sld xmlns:a="http://schemas.openxmlformats.org/drawingml/2006/main" xmlns:r="http://schemas.openxmlformats.org/officeDocument/2006/relationships" xmlns:p="http://schemas.openxmlformats.org/presentationml/2006/main">
   <p:cSld>
     <p:spTree>
@@ -11458,7 +11100,7 @@
 </p:sld>
 </file>
 
-<file path=ppt/slides/slide25.xml><?xml version="1.0" encoding="utf-8"?>
+<file path=ppt/slides/slide24.xml><?xml version="1.0" encoding="utf-8"?>
 <p:sld xmlns:a="http://schemas.openxmlformats.org/drawingml/2006/main" xmlns:r="http://schemas.openxmlformats.org/officeDocument/2006/relationships" xmlns:p="http://schemas.openxmlformats.org/presentationml/2006/main">
   <p:cSld>
     <p:spTree>
@@ -11525,7 +11167,7 @@
 </p:sld>
 </file>
 
-<file path=ppt/slides/slide26.xml><?xml version="1.0" encoding="utf-8"?>
+<file path=ppt/slides/slide25.xml><?xml version="1.0" encoding="utf-8"?>
 <p:sld xmlns:a="http://schemas.openxmlformats.org/drawingml/2006/main" xmlns:r="http://schemas.openxmlformats.org/officeDocument/2006/relationships" xmlns:p="http://schemas.openxmlformats.org/presentationml/2006/main">
   <p:cSld>
     <p:spTree>
@@ -12262,7 +11904,7 @@
   <p:cSld>
     <p:spTree>
       <p:nvGrpSpPr>
-        <p:cNvPr id="1" name="Shape 111"/>
+        <p:cNvPr id="1" name="Shape 136"/>
         <p:cNvGrpSpPr/>
         <p:nvPr/>
       </p:nvGrpSpPr>
@@ -12276,7 +11918,7 @@
       </p:grpSpPr>
       <p:sp>
         <p:nvSpPr>
-          <p:cNvPr id="112" name="Google Shape;112;p21"/>
+          <p:cNvPr id="137" name="Google Shape;137;p25"/>
           <p:cNvSpPr txBox="1">
             <a:spLocks noGrp="1"/>
           </p:cNvSpPr>
@@ -12310,30 +11952,22 @@
             </a:pPr>
             <a:r>
               <a:rPr lang="en"/>
-              <a:t>Контактни температурни сензори</a:t>
+              <a:t>Проблеми със съществуващите решения</a:t>
             </a:r>
             <a:endParaRPr/>
           </a:p>
         </p:txBody>
       </p:sp>
-      <p:pic>
-        <p:nvPicPr>
-          <p:cNvPr id="113" name="Google Shape;113;p21"/>
-          <p:cNvPicPr preferRelativeResize="0"/>
+      <p:sp>
+        <p:nvSpPr>
+          <p:cNvPr id="138" name="Google Shape;138;p25"/>
+          <p:cNvSpPr txBox="1"/>
           <p:nvPr/>
-        </p:nvPicPr>
-        <p:blipFill>
-          <a:blip r:embed="rId3">
-            <a:alphaModFix/>
-          </a:blip>
-          <a:stretch>
-            <a:fillRect/>
-          </a:stretch>
-        </p:blipFill>
-        <p:spPr>
-          <a:xfrm>
-            <a:off x="1270625" y="1360125"/>
-            <a:ext cx="6602798" cy="3714074"/>
+        </p:nvSpPr>
+        <p:spPr>
+          <a:xfrm>
+            <a:off x="311725" y="1857292"/>
+            <a:ext cx="7538100" cy="2202300"/>
           </a:xfrm>
           <a:prstGeom prst="rect">
             <a:avLst/>
@@ -12343,7 +11977,173 @@
             <a:noFill/>
           </a:ln>
         </p:spPr>
-      </p:pic>
+        <p:txBody>
+          <a:bodyPr spcFirstLastPara="1" wrap="square" lIns="91425" tIns="91425" rIns="91425" bIns="91425" anchor="t" anchorCtr="0">
+            <a:noAutofit/>
+          </a:bodyPr>
+          <a:lstStyle/>
+          <a:p>
+            <a:pPr marL="457200" lvl="0" indent="-381000" algn="l" rtl="0">
+              <a:lnSpc>
+                <a:spcPct val="150000"/>
+              </a:lnSpc>
+              <a:spcBef>
+                <a:spcPts val="0"/>
+              </a:spcBef>
+              <a:spcAft>
+                <a:spcPts val="0"/>
+              </a:spcAft>
+              <a:buClr>
+                <a:schemeClr val="dk1"/>
+              </a:buClr>
+              <a:buSzPts val="2400"/>
+              <a:buFont typeface="Roboto"/>
+              <a:buChar char="●"/>
+            </a:pPr>
+            <a:r>
+              <a:rPr lang="en" sz="2400" dirty="0">
+                <a:solidFill>
+                  <a:schemeClr val="dk1"/>
+                </a:solidFill>
+                <a:latin typeface="Roboto"/>
+                <a:ea typeface="Roboto"/>
+                <a:cs typeface="Roboto"/>
+                <a:sym typeface="Roboto"/>
+              </a:rPr>
+              <a:t>Бавно семплиране - обикновено до няколко Hz</a:t>
+            </a:r>
+            <a:endParaRPr sz="2400" dirty="0">
+              <a:solidFill>
+                <a:schemeClr val="dk1"/>
+              </a:solidFill>
+              <a:latin typeface="Roboto"/>
+              <a:ea typeface="Roboto"/>
+              <a:cs typeface="Roboto"/>
+              <a:sym typeface="Roboto"/>
+            </a:endParaRPr>
+          </a:p>
+          <a:p>
+            <a:pPr marL="457200" lvl="0" indent="-381000" algn="l" rtl="0">
+              <a:lnSpc>
+                <a:spcPct val="150000"/>
+              </a:lnSpc>
+              <a:spcBef>
+                <a:spcPts val="0"/>
+              </a:spcBef>
+              <a:spcAft>
+                <a:spcPts val="0"/>
+              </a:spcAft>
+              <a:buClr>
+                <a:schemeClr val="dk1"/>
+              </a:buClr>
+              <a:buSzPts val="2400"/>
+              <a:buFont typeface="Roboto"/>
+              <a:buChar char="●"/>
+            </a:pPr>
+            <a:r>
+              <a:rPr lang="en" sz="2400" dirty="0">
+                <a:solidFill>
+                  <a:schemeClr val="dk1"/>
+                </a:solidFill>
+                <a:latin typeface="Roboto"/>
+                <a:ea typeface="Roboto"/>
+                <a:cs typeface="Roboto"/>
+                <a:sym typeface="Roboto"/>
+              </a:rPr>
+              <a:t>Висока цена</a:t>
+            </a:r>
+            <a:endParaRPr sz="2400" dirty="0">
+              <a:solidFill>
+                <a:schemeClr val="dk1"/>
+              </a:solidFill>
+              <a:latin typeface="Roboto"/>
+              <a:ea typeface="Roboto"/>
+              <a:cs typeface="Roboto"/>
+              <a:sym typeface="Roboto"/>
+            </a:endParaRPr>
+          </a:p>
+          <a:p>
+            <a:pPr marL="457200" lvl="0" indent="-381000" algn="l" rtl="0">
+              <a:lnSpc>
+                <a:spcPct val="150000"/>
+              </a:lnSpc>
+              <a:spcBef>
+                <a:spcPts val="0"/>
+              </a:spcBef>
+              <a:spcAft>
+                <a:spcPts val="0"/>
+              </a:spcAft>
+              <a:buClr>
+                <a:schemeClr val="dk1"/>
+              </a:buClr>
+              <a:buSzPts val="2400"/>
+              <a:buFont typeface="Roboto"/>
+              <a:buChar char="●"/>
+            </a:pPr>
+            <a:r>
+              <a:rPr lang="en" sz="2400" dirty="0">
+                <a:solidFill>
+                  <a:schemeClr val="dk1"/>
+                </a:solidFill>
+                <a:latin typeface="Roboto"/>
+                <a:ea typeface="Roboto"/>
+                <a:cs typeface="Roboto"/>
+                <a:sym typeface="Roboto"/>
+              </a:rPr>
+              <a:t>Липса на филтрация на входовете</a:t>
+            </a:r>
+            <a:endParaRPr sz="2400" dirty="0">
+              <a:solidFill>
+                <a:schemeClr val="dk1"/>
+              </a:solidFill>
+              <a:latin typeface="Roboto"/>
+              <a:ea typeface="Roboto"/>
+              <a:cs typeface="Roboto"/>
+              <a:sym typeface="Roboto"/>
+            </a:endParaRPr>
+          </a:p>
+          <a:p>
+            <a:pPr marL="457200" lvl="0" indent="-381000" algn="l" rtl="0">
+              <a:lnSpc>
+                <a:spcPct val="150000"/>
+              </a:lnSpc>
+              <a:spcBef>
+                <a:spcPts val="0"/>
+              </a:spcBef>
+              <a:spcAft>
+                <a:spcPts val="0"/>
+              </a:spcAft>
+              <a:buClr>
+                <a:schemeClr val="dk1"/>
+              </a:buClr>
+              <a:buSzPts val="2400"/>
+              <a:buFont typeface="Roboto"/>
+              <a:buChar char="●"/>
+            </a:pPr>
+            <a:r>
+              <a:rPr lang="en" sz="2400" dirty="0">
+                <a:solidFill>
+                  <a:schemeClr val="dk1"/>
+                </a:solidFill>
+                <a:latin typeface="Roboto"/>
+                <a:ea typeface="Roboto"/>
+                <a:cs typeface="Roboto"/>
+                <a:sym typeface="Roboto"/>
+              </a:rPr>
+              <a:t>Частично решение - неизгодно</a:t>
+            </a:r>
+            <a:endParaRPr sz="2400" dirty="0">
+              <a:solidFill>
+                <a:schemeClr val="dk1"/>
+              </a:solidFill>
+              <a:latin typeface="Roboto"/>
+              <a:ea typeface="Roboto"/>
+              <a:cs typeface="Roboto"/>
+              <a:sym typeface="Roboto"/>
+            </a:endParaRPr>
+          </a:p>
+        </p:txBody>
+      </p:sp>
     </p:spTree>
   </p:cSld>
   <p:clrMapOvr>
@@ -12404,10 +12204,10 @@
               <a:buNone/>
             </a:pPr>
             <a:r>
-              <a:rPr lang="en"/>
-              <a:t>Контактни сензори - сравнение</a:t>
+              <a:rPr lang="bg-BG" dirty="0"/>
+              <a:t>Избор на температурен сензор</a:t>
             </a:r>
-            <a:endParaRPr/>
+            <a:endParaRPr dirty="0"/>
           </a:p>
         </p:txBody>
       </p:sp>

</xml_diff>